<commit_message>
Update the Project PPT
</commit_message>
<xml_diff>
--- a/doc/ELEC590  Project PPT.pptx
+++ b/doc/ELEC590  Project PPT.pptx
@@ -6,13 +6,26 @@
   </p:sldMasterIdLst>
   <p:sldIdLst>
     <p:sldId id="256" r:id="rId2"/>
-    <p:sldId id="257" r:id="rId3"/>
-    <p:sldId id="258" r:id="rId4"/>
+    <p:sldId id="260" r:id="rId3"/>
+    <p:sldId id="264" r:id="rId4"/>
     <p:sldId id="259" r:id="rId5"/>
-    <p:sldId id="260" r:id="rId6"/>
-    <p:sldId id="261" r:id="rId7"/>
-    <p:sldId id="262" r:id="rId8"/>
-    <p:sldId id="263" r:id="rId9"/>
+    <p:sldId id="265" r:id="rId6"/>
+    <p:sldId id="269" r:id="rId7"/>
+    <p:sldId id="266" r:id="rId8"/>
+    <p:sldId id="258" r:id="rId9"/>
+    <p:sldId id="261" r:id="rId10"/>
+    <p:sldId id="267" r:id="rId11"/>
+    <p:sldId id="268" r:id="rId12"/>
+    <p:sldId id="271" r:id="rId13"/>
+    <p:sldId id="272" r:id="rId14"/>
+    <p:sldId id="273" r:id="rId15"/>
+    <p:sldId id="274" r:id="rId16"/>
+    <p:sldId id="275" r:id="rId17"/>
+    <p:sldId id="262" r:id="rId18"/>
+    <p:sldId id="257" r:id="rId19"/>
+    <p:sldId id="270" r:id="rId20"/>
+    <p:sldId id="263" r:id="rId21"/>
+    <p:sldId id="276" r:id="rId22"/>
   </p:sldIdLst>
   <p:sldSz cx="12192000" cy="6858000"/>
   <p:notesSz cx="6858000" cy="9144000"/>
@@ -111,6 +124,11 @@
       </a:defRPr>
     </a:lvl9pPr>
   </p:defaultTextStyle>
+  <p:extLst>
+    <p:ext uri="{EFAFB233-063F-42B5-8137-9DF3F51BA10A}">
+      <p15:sldGuideLst xmlns:p15="http://schemas.microsoft.com/office/powerpoint/2012/main"/>
+    </p:ext>
+  </p:extLst>
 </p:presentation>
 </file>
 
@@ -245,7 +263,7 @@
           <a:p>
             <a:fld id="{0BC55DDB-6F57-4774-AC13-817719C99B7B}" type="datetimeFigureOut">
               <a:rPr lang="zh-CN" altLang="en-US" smtClean="0"/>
-              <a:t>2014/11/6</a:t>
+              <a:t>2014/11/23</a:t>
             </a:fld>
             <a:endParaRPr lang="zh-CN" altLang="en-US"/>
           </a:p>
@@ -415,7 +433,7 @@
           <a:p>
             <a:fld id="{0BC55DDB-6F57-4774-AC13-817719C99B7B}" type="datetimeFigureOut">
               <a:rPr lang="zh-CN" altLang="en-US" smtClean="0"/>
-              <a:t>2014/11/6</a:t>
+              <a:t>2014/11/23</a:t>
             </a:fld>
             <a:endParaRPr lang="zh-CN" altLang="en-US"/>
           </a:p>
@@ -595,7 +613,7 @@
           <a:p>
             <a:fld id="{0BC55DDB-6F57-4774-AC13-817719C99B7B}" type="datetimeFigureOut">
               <a:rPr lang="zh-CN" altLang="en-US" smtClean="0"/>
-              <a:t>2014/11/6</a:t>
+              <a:t>2014/11/23</a:t>
             </a:fld>
             <a:endParaRPr lang="zh-CN" altLang="en-US"/>
           </a:p>
@@ -765,7 +783,7 @@
           <a:p>
             <a:fld id="{0BC55DDB-6F57-4774-AC13-817719C99B7B}" type="datetimeFigureOut">
               <a:rPr lang="zh-CN" altLang="en-US" smtClean="0"/>
-              <a:t>2014/11/6</a:t>
+              <a:t>2014/11/23</a:t>
             </a:fld>
             <a:endParaRPr lang="zh-CN" altLang="en-US"/>
           </a:p>
@@ -1011,7 +1029,7 @@
           <a:p>
             <a:fld id="{0BC55DDB-6F57-4774-AC13-817719C99B7B}" type="datetimeFigureOut">
               <a:rPr lang="zh-CN" altLang="en-US" smtClean="0"/>
-              <a:t>2014/11/6</a:t>
+              <a:t>2014/11/23</a:t>
             </a:fld>
             <a:endParaRPr lang="zh-CN" altLang="en-US"/>
           </a:p>
@@ -1243,7 +1261,7 @@
           <a:p>
             <a:fld id="{0BC55DDB-6F57-4774-AC13-817719C99B7B}" type="datetimeFigureOut">
               <a:rPr lang="zh-CN" altLang="en-US" smtClean="0"/>
-              <a:t>2014/11/6</a:t>
+              <a:t>2014/11/23</a:t>
             </a:fld>
             <a:endParaRPr lang="zh-CN" altLang="en-US"/>
           </a:p>
@@ -1610,7 +1628,7 @@
           <a:p>
             <a:fld id="{0BC55DDB-6F57-4774-AC13-817719C99B7B}" type="datetimeFigureOut">
               <a:rPr lang="zh-CN" altLang="en-US" smtClean="0"/>
-              <a:t>2014/11/6</a:t>
+              <a:t>2014/11/23</a:t>
             </a:fld>
             <a:endParaRPr lang="zh-CN" altLang="en-US"/>
           </a:p>
@@ -1728,7 +1746,7 @@
           <a:p>
             <a:fld id="{0BC55DDB-6F57-4774-AC13-817719C99B7B}" type="datetimeFigureOut">
               <a:rPr lang="zh-CN" altLang="en-US" smtClean="0"/>
-              <a:t>2014/11/6</a:t>
+              <a:t>2014/11/23</a:t>
             </a:fld>
             <a:endParaRPr lang="zh-CN" altLang="en-US"/>
           </a:p>
@@ -1823,7 +1841,7 @@
           <a:p>
             <a:fld id="{0BC55DDB-6F57-4774-AC13-817719C99B7B}" type="datetimeFigureOut">
               <a:rPr lang="zh-CN" altLang="en-US" smtClean="0"/>
-              <a:t>2014/11/6</a:t>
+              <a:t>2014/11/23</a:t>
             </a:fld>
             <a:endParaRPr lang="zh-CN" altLang="en-US"/>
           </a:p>
@@ -2100,7 +2118,7 @@
           <a:p>
             <a:fld id="{0BC55DDB-6F57-4774-AC13-817719C99B7B}" type="datetimeFigureOut">
               <a:rPr lang="zh-CN" altLang="en-US" smtClean="0"/>
-              <a:t>2014/11/6</a:t>
+              <a:t>2014/11/23</a:t>
             </a:fld>
             <a:endParaRPr lang="zh-CN" altLang="en-US"/>
           </a:p>
@@ -2353,7 +2371,7 @@
           <a:p>
             <a:fld id="{0BC55DDB-6F57-4774-AC13-817719C99B7B}" type="datetimeFigureOut">
               <a:rPr lang="zh-CN" altLang="en-US" smtClean="0"/>
-              <a:t>2014/11/6</a:t>
+              <a:t>2014/11/23</a:t>
             </a:fld>
             <a:endParaRPr lang="zh-CN" altLang="en-US"/>
           </a:p>
@@ -2566,7 +2584,7 @@
           <a:p>
             <a:fld id="{0BC55DDB-6F57-4774-AC13-817719C99B7B}" type="datetimeFigureOut">
               <a:rPr lang="zh-CN" altLang="en-US" smtClean="0"/>
-              <a:t>2014/11/6</a:t>
+              <a:t>2014/11/23</a:t>
             </a:fld>
             <a:endParaRPr lang="zh-CN" altLang="en-US"/>
           </a:p>
@@ -3030,6 +3048,777 @@
 </p:sld>
 </file>
 
+<file path=ppt/slides/slide10.xml><?xml version="1.0" encoding="utf-8"?>
+<p:sld xmlns:a="http://schemas.openxmlformats.org/drawingml/2006/main" xmlns:r="http://schemas.openxmlformats.org/officeDocument/2006/relationships" xmlns:p="http://schemas.openxmlformats.org/presentationml/2006/main">
+  <p:cSld>
+    <p:spTree>
+      <p:nvGrpSpPr>
+        <p:cNvPr id="1" name=""/>
+        <p:cNvGrpSpPr/>
+        <p:nvPr/>
+      </p:nvGrpSpPr>
+      <p:grpSpPr>
+        <a:xfrm>
+          <a:off x="0" y="0"/>
+          <a:ext cx="0" cy="0"/>
+          <a:chOff x="0" y="0"/>
+          <a:chExt cx="0" cy="0"/>
+        </a:xfrm>
+      </p:grpSpPr>
+      <p:sp>
+        <p:nvSpPr>
+          <p:cNvPr id="2" name="标题 1"/>
+          <p:cNvSpPr>
+            <a:spLocks noGrp="1"/>
+          </p:cNvSpPr>
+          <p:nvPr>
+            <p:ph type="title"/>
+          </p:nvPr>
+        </p:nvSpPr>
+        <p:spPr/>
+        <p:txBody>
+          <a:bodyPr/>
+          <a:lstStyle/>
+          <a:p>
+            <a:r>
+              <a:rPr lang="en-US" altLang="zh-CN" dirty="0" smtClean="0"/>
+              <a:t>SSL</a:t>
+            </a:r>
+            <a:r>
+              <a:rPr lang="zh-CN" altLang="en-US" dirty="0" smtClean="0"/>
+              <a:t> </a:t>
+            </a:r>
+            <a:r>
+              <a:rPr lang="en-US" altLang="zh-CN" dirty="0" smtClean="0"/>
+              <a:t>Communication</a:t>
+            </a:r>
+            <a:endParaRPr lang="zh-CN" altLang="en-US" dirty="0"/>
+          </a:p>
+        </p:txBody>
+      </p:sp>
+      <p:sp>
+        <p:nvSpPr>
+          <p:cNvPr id="3" name="内容占位符 2"/>
+          <p:cNvSpPr>
+            <a:spLocks noGrp="1"/>
+          </p:cNvSpPr>
+          <p:nvPr>
+            <p:ph idx="1"/>
+          </p:nvPr>
+        </p:nvSpPr>
+        <p:spPr/>
+        <p:txBody>
+          <a:bodyPr/>
+          <a:lstStyle/>
+          <a:p>
+            <a:r>
+              <a:rPr lang="en-US" altLang="zh-CN" dirty="0" smtClean="0"/>
+              <a:t>Maybe 2-3 Pages</a:t>
+            </a:r>
+            <a:endParaRPr lang="zh-CN" altLang="en-US" dirty="0"/>
+          </a:p>
+        </p:txBody>
+      </p:sp>
+    </p:spTree>
+    <p:extLst>
+      <p:ext uri="{BB962C8B-B14F-4D97-AF65-F5344CB8AC3E}">
+        <p14:creationId xmlns:p14="http://schemas.microsoft.com/office/powerpoint/2010/main" val="3931020243"/>
+      </p:ext>
+    </p:extLst>
+  </p:cSld>
+  <p:clrMapOvr>
+    <a:masterClrMapping/>
+  </p:clrMapOvr>
+</p:sld>
+</file>
+
+<file path=ppt/slides/slide11.xml><?xml version="1.0" encoding="utf-8"?>
+<p:sld xmlns:a="http://schemas.openxmlformats.org/drawingml/2006/main" xmlns:r="http://schemas.openxmlformats.org/officeDocument/2006/relationships" xmlns:p="http://schemas.openxmlformats.org/presentationml/2006/main">
+  <p:cSld>
+    <p:spTree>
+      <p:nvGrpSpPr>
+        <p:cNvPr id="1" name=""/>
+        <p:cNvGrpSpPr/>
+        <p:nvPr/>
+      </p:nvGrpSpPr>
+      <p:grpSpPr>
+        <a:xfrm>
+          <a:off x="0" y="0"/>
+          <a:ext cx="0" cy="0"/>
+          <a:chOff x="0" y="0"/>
+          <a:chExt cx="0" cy="0"/>
+        </a:xfrm>
+      </p:grpSpPr>
+      <p:sp>
+        <p:nvSpPr>
+          <p:cNvPr id="2" name="标题 1"/>
+          <p:cNvSpPr>
+            <a:spLocks noGrp="1"/>
+          </p:cNvSpPr>
+          <p:nvPr>
+            <p:ph type="title"/>
+          </p:nvPr>
+        </p:nvSpPr>
+        <p:spPr/>
+        <p:txBody>
+          <a:bodyPr/>
+          <a:lstStyle/>
+          <a:p>
+            <a:r>
+              <a:rPr lang="en-US" altLang="zh-CN" dirty="0" smtClean="0"/>
+              <a:t>SSL</a:t>
+            </a:r>
+            <a:r>
+              <a:rPr lang="zh-CN" altLang="en-US" dirty="0" smtClean="0"/>
+              <a:t> </a:t>
+            </a:r>
+            <a:r>
+              <a:rPr lang="en-US" altLang="zh-CN" dirty="0" smtClean="0"/>
+              <a:t>Communication</a:t>
+            </a:r>
+            <a:endParaRPr lang="zh-CN" altLang="en-US" dirty="0"/>
+          </a:p>
+        </p:txBody>
+      </p:sp>
+      <p:sp>
+        <p:nvSpPr>
+          <p:cNvPr id="3" name="内容占位符 2"/>
+          <p:cNvSpPr>
+            <a:spLocks noGrp="1"/>
+          </p:cNvSpPr>
+          <p:nvPr>
+            <p:ph idx="1"/>
+          </p:nvPr>
+        </p:nvSpPr>
+        <p:spPr/>
+        <p:txBody>
+          <a:bodyPr/>
+          <a:lstStyle/>
+          <a:p>
+            <a:r>
+              <a:rPr lang="en-US" altLang="zh-CN" dirty="0" smtClean="0"/>
+              <a:t>Maybe 2-3 Pages</a:t>
+            </a:r>
+            <a:endParaRPr lang="zh-CN" altLang="en-US" dirty="0"/>
+          </a:p>
+        </p:txBody>
+      </p:sp>
+    </p:spTree>
+    <p:extLst>
+      <p:ext uri="{BB962C8B-B14F-4D97-AF65-F5344CB8AC3E}">
+        <p14:creationId xmlns:p14="http://schemas.microsoft.com/office/powerpoint/2010/main" val="1889089862"/>
+      </p:ext>
+    </p:extLst>
+  </p:cSld>
+  <p:clrMapOvr>
+    <a:masterClrMapping/>
+  </p:clrMapOvr>
+</p:sld>
+</file>
+
+<file path=ppt/slides/slide12.xml><?xml version="1.0" encoding="utf-8"?>
+<p:sld xmlns:a="http://schemas.openxmlformats.org/drawingml/2006/main" xmlns:r="http://schemas.openxmlformats.org/officeDocument/2006/relationships" xmlns:p="http://schemas.openxmlformats.org/presentationml/2006/main">
+  <p:cSld>
+    <p:spTree>
+      <p:nvGrpSpPr>
+        <p:cNvPr id="1" name=""/>
+        <p:cNvGrpSpPr/>
+        <p:nvPr/>
+      </p:nvGrpSpPr>
+      <p:grpSpPr>
+        <a:xfrm>
+          <a:off x="0" y="0"/>
+          <a:ext cx="0" cy="0"/>
+          <a:chOff x="0" y="0"/>
+          <a:chExt cx="0" cy="0"/>
+        </a:xfrm>
+      </p:grpSpPr>
+      <p:sp>
+        <p:nvSpPr>
+          <p:cNvPr id="2" name="标题 1"/>
+          <p:cNvSpPr>
+            <a:spLocks noGrp="1"/>
+          </p:cNvSpPr>
+          <p:nvPr>
+            <p:ph type="title"/>
+          </p:nvPr>
+        </p:nvSpPr>
+        <p:spPr/>
+        <p:txBody>
+          <a:bodyPr/>
+          <a:lstStyle/>
+          <a:p>
+            <a:r>
+              <a:rPr lang="en-US" altLang="zh-CN" dirty="0" err="1" smtClean="0"/>
+              <a:t>Inotify</a:t>
+            </a:r>
+            <a:endParaRPr lang="zh-CN" altLang="en-US" dirty="0"/>
+          </a:p>
+        </p:txBody>
+      </p:sp>
+      <p:sp>
+        <p:nvSpPr>
+          <p:cNvPr id="3" name="内容占位符 2"/>
+          <p:cNvSpPr>
+            <a:spLocks noGrp="1"/>
+          </p:cNvSpPr>
+          <p:nvPr>
+            <p:ph idx="1"/>
+          </p:nvPr>
+        </p:nvSpPr>
+        <p:spPr/>
+        <p:txBody>
+          <a:bodyPr/>
+          <a:lstStyle/>
+          <a:p>
+            <a:r>
+              <a:rPr lang="en-US" altLang="zh-CN" dirty="0" smtClean="0"/>
+              <a:t>Maybe 1-2 Pages</a:t>
+            </a:r>
+            <a:endParaRPr lang="zh-CN" altLang="en-US" dirty="0"/>
+          </a:p>
+        </p:txBody>
+      </p:sp>
+    </p:spTree>
+    <p:extLst>
+      <p:ext uri="{BB962C8B-B14F-4D97-AF65-F5344CB8AC3E}">
+        <p14:creationId xmlns:p14="http://schemas.microsoft.com/office/powerpoint/2010/main" val="3778043732"/>
+      </p:ext>
+    </p:extLst>
+  </p:cSld>
+  <p:clrMapOvr>
+    <a:masterClrMapping/>
+  </p:clrMapOvr>
+</p:sld>
+</file>
+
+<file path=ppt/slides/slide13.xml><?xml version="1.0" encoding="utf-8"?>
+<p:sld xmlns:a="http://schemas.openxmlformats.org/drawingml/2006/main" xmlns:r="http://schemas.openxmlformats.org/officeDocument/2006/relationships" xmlns:p="http://schemas.openxmlformats.org/presentationml/2006/main">
+  <p:cSld>
+    <p:spTree>
+      <p:nvGrpSpPr>
+        <p:cNvPr id="1" name=""/>
+        <p:cNvGrpSpPr/>
+        <p:nvPr/>
+      </p:nvGrpSpPr>
+      <p:grpSpPr>
+        <a:xfrm>
+          <a:off x="0" y="0"/>
+          <a:ext cx="0" cy="0"/>
+          <a:chOff x="0" y="0"/>
+          <a:chExt cx="0" cy="0"/>
+        </a:xfrm>
+      </p:grpSpPr>
+      <p:sp>
+        <p:nvSpPr>
+          <p:cNvPr id="2" name="标题 1"/>
+          <p:cNvSpPr>
+            <a:spLocks noGrp="1"/>
+          </p:cNvSpPr>
+          <p:nvPr>
+            <p:ph type="title"/>
+          </p:nvPr>
+        </p:nvSpPr>
+        <p:spPr/>
+        <p:txBody>
+          <a:bodyPr/>
+          <a:lstStyle/>
+          <a:p>
+            <a:r>
+              <a:rPr lang="en-US" altLang="zh-CN" dirty="0" err="1" smtClean="0"/>
+              <a:t>Inotify</a:t>
+            </a:r>
+            <a:endParaRPr lang="zh-CN" altLang="en-US" dirty="0"/>
+          </a:p>
+        </p:txBody>
+      </p:sp>
+      <p:sp>
+        <p:nvSpPr>
+          <p:cNvPr id="3" name="内容占位符 2"/>
+          <p:cNvSpPr>
+            <a:spLocks noGrp="1"/>
+          </p:cNvSpPr>
+          <p:nvPr>
+            <p:ph idx="1"/>
+          </p:nvPr>
+        </p:nvSpPr>
+        <p:spPr/>
+        <p:txBody>
+          <a:bodyPr/>
+          <a:lstStyle/>
+          <a:p>
+            <a:r>
+              <a:rPr lang="en-US" altLang="zh-CN" dirty="0" smtClean="0"/>
+              <a:t>Maybe 1-2 Pages</a:t>
+            </a:r>
+            <a:endParaRPr lang="zh-CN" altLang="en-US" dirty="0"/>
+          </a:p>
+        </p:txBody>
+      </p:sp>
+    </p:spTree>
+    <p:extLst>
+      <p:ext uri="{BB962C8B-B14F-4D97-AF65-F5344CB8AC3E}">
+        <p14:creationId xmlns:p14="http://schemas.microsoft.com/office/powerpoint/2010/main" val="4258028936"/>
+      </p:ext>
+    </p:extLst>
+  </p:cSld>
+  <p:clrMapOvr>
+    <a:masterClrMapping/>
+  </p:clrMapOvr>
+</p:sld>
+</file>
+
+<file path=ppt/slides/slide14.xml><?xml version="1.0" encoding="utf-8"?>
+<p:sld xmlns:a="http://schemas.openxmlformats.org/drawingml/2006/main" xmlns:r="http://schemas.openxmlformats.org/officeDocument/2006/relationships" xmlns:p="http://schemas.openxmlformats.org/presentationml/2006/main">
+  <p:cSld>
+    <p:spTree>
+      <p:nvGrpSpPr>
+        <p:cNvPr id="1" name=""/>
+        <p:cNvGrpSpPr/>
+        <p:nvPr/>
+      </p:nvGrpSpPr>
+      <p:grpSpPr>
+        <a:xfrm>
+          <a:off x="0" y="0"/>
+          <a:ext cx="0" cy="0"/>
+          <a:chOff x="0" y="0"/>
+          <a:chExt cx="0" cy="0"/>
+        </a:xfrm>
+      </p:grpSpPr>
+      <p:sp>
+        <p:nvSpPr>
+          <p:cNvPr id="2" name="标题 1"/>
+          <p:cNvSpPr>
+            <a:spLocks noGrp="1"/>
+          </p:cNvSpPr>
+          <p:nvPr>
+            <p:ph type="title"/>
+          </p:nvPr>
+        </p:nvSpPr>
+        <p:spPr/>
+        <p:txBody>
+          <a:bodyPr/>
+          <a:lstStyle/>
+          <a:p>
+            <a:r>
+              <a:rPr lang="en-US" altLang="zh-CN" dirty="0" smtClean="0"/>
+              <a:t>GIT API</a:t>
+            </a:r>
+            <a:endParaRPr lang="zh-CN" altLang="en-US" dirty="0"/>
+          </a:p>
+        </p:txBody>
+      </p:sp>
+      <p:sp>
+        <p:nvSpPr>
+          <p:cNvPr id="3" name="内容占位符 2"/>
+          <p:cNvSpPr>
+            <a:spLocks noGrp="1"/>
+          </p:cNvSpPr>
+          <p:nvPr>
+            <p:ph idx="1"/>
+          </p:nvPr>
+        </p:nvSpPr>
+        <p:spPr/>
+        <p:txBody>
+          <a:bodyPr/>
+          <a:lstStyle/>
+          <a:p>
+            <a:r>
+              <a:rPr lang="en-US" altLang="zh-CN" dirty="0" smtClean="0"/>
+              <a:t>Maybe 1-2 Pages</a:t>
+            </a:r>
+            <a:endParaRPr lang="zh-CN" altLang="en-US" dirty="0"/>
+          </a:p>
+        </p:txBody>
+      </p:sp>
+    </p:spTree>
+    <p:extLst>
+      <p:ext uri="{BB962C8B-B14F-4D97-AF65-F5344CB8AC3E}">
+        <p14:creationId xmlns:p14="http://schemas.microsoft.com/office/powerpoint/2010/main" val="3603817065"/>
+      </p:ext>
+    </p:extLst>
+  </p:cSld>
+  <p:clrMapOvr>
+    <a:masterClrMapping/>
+  </p:clrMapOvr>
+</p:sld>
+</file>
+
+<file path=ppt/slides/slide15.xml><?xml version="1.0" encoding="utf-8"?>
+<p:sld xmlns:a="http://schemas.openxmlformats.org/drawingml/2006/main" xmlns:r="http://schemas.openxmlformats.org/officeDocument/2006/relationships" xmlns:p="http://schemas.openxmlformats.org/presentationml/2006/main">
+  <p:cSld>
+    <p:spTree>
+      <p:nvGrpSpPr>
+        <p:cNvPr id="1" name=""/>
+        <p:cNvGrpSpPr/>
+        <p:nvPr/>
+      </p:nvGrpSpPr>
+      <p:grpSpPr>
+        <a:xfrm>
+          <a:off x="0" y="0"/>
+          <a:ext cx="0" cy="0"/>
+          <a:chOff x="0" y="0"/>
+          <a:chExt cx="0" cy="0"/>
+        </a:xfrm>
+      </p:grpSpPr>
+      <p:sp>
+        <p:nvSpPr>
+          <p:cNvPr id="2" name="标题 1"/>
+          <p:cNvSpPr>
+            <a:spLocks noGrp="1"/>
+          </p:cNvSpPr>
+          <p:nvPr>
+            <p:ph type="title"/>
+          </p:nvPr>
+        </p:nvSpPr>
+        <p:spPr/>
+        <p:txBody>
+          <a:bodyPr/>
+          <a:lstStyle/>
+          <a:p>
+            <a:r>
+              <a:rPr lang="en-US" altLang="zh-CN" dirty="0" smtClean="0"/>
+              <a:t>GIT API</a:t>
+            </a:r>
+            <a:endParaRPr lang="zh-CN" altLang="en-US" dirty="0"/>
+          </a:p>
+        </p:txBody>
+      </p:sp>
+      <p:sp>
+        <p:nvSpPr>
+          <p:cNvPr id="3" name="内容占位符 2"/>
+          <p:cNvSpPr>
+            <a:spLocks noGrp="1"/>
+          </p:cNvSpPr>
+          <p:nvPr>
+            <p:ph idx="1"/>
+          </p:nvPr>
+        </p:nvSpPr>
+        <p:spPr/>
+        <p:txBody>
+          <a:bodyPr/>
+          <a:lstStyle/>
+          <a:p>
+            <a:r>
+              <a:rPr lang="en-US" altLang="zh-CN" dirty="0" smtClean="0"/>
+              <a:t>Maybe 1-2 Pages</a:t>
+            </a:r>
+            <a:endParaRPr lang="zh-CN" altLang="en-US" dirty="0"/>
+          </a:p>
+        </p:txBody>
+      </p:sp>
+    </p:spTree>
+    <p:extLst>
+      <p:ext uri="{BB962C8B-B14F-4D97-AF65-F5344CB8AC3E}">
+        <p14:creationId xmlns:p14="http://schemas.microsoft.com/office/powerpoint/2010/main" val="3542493299"/>
+      </p:ext>
+    </p:extLst>
+  </p:cSld>
+  <p:clrMapOvr>
+    <a:masterClrMapping/>
+  </p:clrMapOvr>
+</p:sld>
+</file>
+
+<file path=ppt/slides/slide16.xml><?xml version="1.0" encoding="utf-8"?>
+<p:sld xmlns:a="http://schemas.openxmlformats.org/drawingml/2006/main" xmlns:r="http://schemas.openxmlformats.org/officeDocument/2006/relationships" xmlns:p="http://schemas.openxmlformats.org/presentationml/2006/main">
+  <p:cSld>
+    <p:spTree>
+      <p:nvGrpSpPr>
+        <p:cNvPr id="1" name=""/>
+        <p:cNvGrpSpPr/>
+        <p:nvPr/>
+      </p:nvGrpSpPr>
+      <p:grpSpPr>
+        <a:xfrm>
+          <a:off x="0" y="0"/>
+          <a:ext cx="0" cy="0"/>
+          <a:chOff x="0" y="0"/>
+          <a:chExt cx="0" cy="0"/>
+        </a:xfrm>
+      </p:grpSpPr>
+      <p:sp>
+        <p:nvSpPr>
+          <p:cNvPr id="2" name="标题 1"/>
+          <p:cNvSpPr>
+            <a:spLocks noGrp="1"/>
+          </p:cNvSpPr>
+          <p:nvPr>
+            <p:ph type="title"/>
+          </p:nvPr>
+        </p:nvSpPr>
+        <p:spPr/>
+        <p:txBody>
+          <a:bodyPr/>
+          <a:lstStyle/>
+          <a:p>
+            <a:r>
+              <a:rPr lang="en-US" altLang="zh-CN" dirty="0"/>
+              <a:t>System Pipe</a:t>
+            </a:r>
+          </a:p>
+        </p:txBody>
+      </p:sp>
+      <p:sp>
+        <p:nvSpPr>
+          <p:cNvPr id="3" name="内容占位符 2"/>
+          <p:cNvSpPr>
+            <a:spLocks noGrp="1"/>
+          </p:cNvSpPr>
+          <p:nvPr>
+            <p:ph idx="1"/>
+          </p:nvPr>
+        </p:nvSpPr>
+        <p:spPr/>
+        <p:txBody>
+          <a:bodyPr/>
+          <a:lstStyle/>
+          <a:p>
+            <a:r>
+              <a:rPr lang="en-US" altLang="zh-CN" dirty="0" smtClean="0"/>
+              <a:t>1 Page enough</a:t>
+            </a:r>
+            <a:endParaRPr lang="zh-CN" altLang="en-US" dirty="0"/>
+          </a:p>
+        </p:txBody>
+      </p:sp>
+    </p:spTree>
+    <p:extLst>
+      <p:ext uri="{BB962C8B-B14F-4D97-AF65-F5344CB8AC3E}">
+        <p14:creationId xmlns:p14="http://schemas.microsoft.com/office/powerpoint/2010/main" val="2125694673"/>
+      </p:ext>
+    </p:extLst>
+  </p:cSld>
+  <p:clrMapOvr>
+    <a:masterClrMapping/>
+  </p:clrMapOvr>
+</p:sld>
+</file>
+
+<file path=ppt/slides/slide17.xml><?xml version="1.0" encoding="utf-8"?>
+<p:sld xmlns:a="http://schemas.openxmlformats.org/drawingml/2006/main" xmlns:r="http://schemas.openxmlformats.org/officeDocument/2006/relationships" xmlns:p="http://schemas.openxmlformats.org/presentationml/2006/main">
+  <p:cSld>
+    <p:spTree>
+      <p:nvGrpSpPr>
+        <p:cNvPr id="1" name=""/>
+        <p:cNvGrpSpPr/>
+        <p:nvPr/>
+      </p:nvGrpSpPr>
+      <p:grpSpPr>
+        <a:xfrm>
+          <a:off x="0" y="0"/>
+          <a:ext cx="0" cy="0"/>
+          <a:chOff x="0" y="0"/>
+          <a:chExt cx="0" cy="0"/>
+        </a:xfrm>
+      </p:grpSpPr>
+      <p:sp>
+        <p:nvSpPr>
+          <p:cNvPr id="2" name="标题 1"/>
+          <p:cNvSpPr>
+            <a:spLocks noGrp="1"/>
+          </p:cNvSpPr>
+          <p:nvPr>
+            <p:ph type="title"/>
+          </p:nvPr>
+        </p:nvSpPr>
+        <p:spPr/>
+        <p:txBody>
+          <a:bodyPr/>
+          <a:lstStyle/>
+          <a:p>
+            <a:r>
+              <a:rPr lang="en-US" altLang="zh-CN" dirty="0" smtClean="0"/>
+              <a:t>Project Management</a:t>
+            </a:r>
+            <a:endParaRPr lang="zh-CN" altLang="en-US" dirty="0"/>
+          </a:p>
+        </p:txBody>
+      </p:sp>
+      <p:sp>
+        <p:nvSpPr>
+          <p:cNvPr id="3" name="内容占位符 2"/>
+          <p:cNvSpPr>
+            <a:spLocks noGrp="1"/>
+          </p:cNvSpPr>
+          <p:nvPr>
+            <p:ph idx="1"/>
+          </p:nvPr>
+        </p:nvSpPr>
+        <p:spPr/>
+        <p:txBody>
+          <a:bodyPr/>
+          <a:lstStyle/>
+          <a:p>
+            <a:endParaRPr lang="zh-CN" altLang="en-US" dirty="0"/>
+          </a:p>
+        </p:txBody>
+      </p:sp>
+    </p:spTree>
+    <p:extLst>
+      <p:ext uri="{BB962C8B-B14F-4D97-AF65-F5344CB8AC3E}">
+        <p14:creationId xmlns:p14="http://schemas.microsoft.com/office/powerpoint/2010/main" val="1191718613"/>
+      </p:ext>
+    </p:extLst>
+  </p:cSld>
+  <p:clrMapOvr>
+    <a:masterClrMapping/>
+  </p:clrMapOvr>
+</p:sld>
+</file>
+
+<file path=ppt/slides/slide18.xml><?xml version="1.0" encoding="utf-8"?>
+<p:sld xmlns:a="http://schemas.openxmlformats.org/drawingml/2006/main" xmlns:r="http://schemas.openxmlformats.org/officeDocument/2006/relationships" xmlns:p="http://schemas.openxmlformats.org/presentationml/2006/main">
+  <p:cSld>
+    <p:spTree>
+      <p:nvGrpSpPr>
+        <p:cNvPr id="1" name=""/>
+        <p:cNvGrpSpPr/>
+        <p:nvPr/>
+      </p:nvGrpSpPr>
+      <p:grpSpPr>
+        <a:xfrm>
+          <a:off x="0" y="0"/>
+          <a:ext cx="0" cy="0"/>
+          <a:chOff x="0" y="0"/>
+          <a:chExt cx="0" cy="0"/>
+        </a:xfrm>
+      </p:grpSpPr>
+      <p:sp>
+        <p:nvSpPr>
+          <p:cNvPr id="2" name="标题 1"/>
+          <p:cNvSpPr>
+            <a:spLocks noGrp="1"/>
+          </p:cNvSpPr>
+          <p:nvPr>
+            <p:ph type="title"/>
+          </p:nvPr>
+        </p:nvSpPr>
+        <p:spPr/>
+        <p:txBody>
+          <a:bodyPr/>
+          <a:lstStyle/>
+          <a:p>
+            <a:r>
+              <a:rPr lang="en-US" altLang="zh-CN" dirty="0" smtClean="0"/>
+              <a:t>Team Member &amp; Roles</a:t>
+            </a:r>
+            <a:endParaRPr lang="zh-CN" altLang="en-US" dirty="0"/>
+          </a:p>
+        </p:txBody>
+      </p:sp>
+      <p:sp>
+        <p:nvSpPr>
+          <p:cNvPr id="3" name="内容占位符 2"/>
+          <p:cNvSpPr>
+            <a:spLocks noGrp="1"/>
+          </p:cNvSpPr>
+          <p:nvPr>
+            <p:ph idx="1"/>
+          </p:nvPr>
+        </p:nvSpPr>
+        <p:spPr/>
+        <p:txBody>
+          <a:bodyPr/>
+          <a:lstStyle/>
+          <a:p>
+            <a:r>
+              <a:rPr lang="en-US" altLang="zh-CN" dirty="0" smtClean="0"/>
+              <a:t>Three column with photos</a:t>
+            </a:r>
+            <a:endParaRPr lang="zh-CN" altLang="en-US" dirty="0"/>
+          </a:p>
+        </p:txBody>
+      </p:sp>
+    </p:spTree>
+    <p:extLst>
+      <p:ext uri="{BB962C8B-B14F-4D97-AF65-F5344CB8AC3E}">
+        <p14:creationId xmlns:p14="http://schemas.microsoft.com/office/powerpoint/2010/main" val="384563103"/>
+      </p:ext>
+    </p:extLst>
+  </p:cSld>
+  <p:clrMapOvr>
+    <a:masterClrMapping/>
+  </p:clrMapOvr>
+</p:sld>
+</file>
+
+<file path=ppt/slides/slide19.xml><?xml version="1.0" encoding="utf-8"?>
+<p:sld xmlns:a="http://schemas.openxmlformats.org/drawingml/2006/main" xmlns:r="http://schemas.openxmlformats.org/officeDocument/2006/relationships" xmlns:p="http://schemas.openxmlformats.org/presentationml/2006/main">
+  <p:cSld>
+    <p:spTree>
+      <p:nvGrpSpPr>
+        <p:cNvPr id="1" name=""/>
+        <p:cNvGrpSpPr/>
+        <p:nvPr/>
+      </p:nvGrpSpPr>
+      <p:grpSpPr>
+        <a:xfrm>
+          <a:off x="0" y="0"/>
+          <a:ext cx="0" cy="0"/>
+          <a:chOff x="0" y="0"/>
+          <a:chExt cx="0" cy="0"/>
+        </a:xfrm>
+      </p:grpSpPr>
+      <p:sp>
+        <p:nvSpPr>
+          <p:cNvPr id="2" name="标题 1"/>
+          <p:cNvSpPr>
+            <a:spLocks noGrp="1"/>
+          </p:cNvSpPr>
+          <p:nvPr>
+            <p:ph type="title"/>
+          </p:nvPr>
+        </p:nvSpPr>
+        <p:spPr/>
+        <p:txBody>
+          <a:bodyPr/>
+          <a:lstStyle/>
+          <a:p>
+            <a:r>
+              <a:rPr lang="en-US" altLang="zh-CN" dirty="0" smtClean="0"/>
+              <a:t>Work Distribution </a:t>
+            </a:r>
+            <a:endParaRPr lang="zh-CN" altLang="en-US" dirty="0"/>
+          </a:p>
+        </p:txBody>
+      </p:sp>
+      <p:sp>
+        <p:nvSpPr>
+          <p:cNvPr id="3" name="内容占位符 2"/>
+          <p:cNvSpPr>
+            <a:spLocks noGrp="1"/>
+          </p:cNvSpPr>
+          <p:nvPr>
+            <p:ph idx="1"/>
+          </p:nvPr>
+        </p:nvSpPr>
+        <p:spPr/>
+        <p:txBody>
+          <a:bodyPr/>
+          <a:lstStyle/>
+          <a:p>
+            <a:r>
+              <a:rPr lang="en-US" altLang="zh-CN" dirty="0" smtClean="0"/>
+              <a:t>Team member   mapping with    modules.(IN TABLE)</a:t>
+            </a:r>
+            <a:endParaRPr lang="zh-CN" altLang="en-US" dirty="0"/>
+          </a:p>
+        </p:txBody>
+      </p:sp>
+    </p:spTree>
+    <p:extLst>
+      <p:ext uri="{BB962C8B-B14F-4D97-AF65-F5344CB8AC3E}">
+        <p14:creationId xmlns:p14="http://schemas.microsoft.com/office/powerpoint/2010/main" val="1654792341"/>
+      </p:ext>
+    </p:extLst>
+  </p:cSld>
+  <p:clrMapOvr>
+    <a:masterClrMapping/>
+  </p:clrMapOvr>
+</p:sld>
+</file>
+
 <file path=ppt/slides/slide2.xml><?xml version="1.0" encoding="utf-8"?>
 <p:sld xmlns:a="http://schemas.openxmlformats.org/drawingml/2006/main" xmlns:r="http://schemas.openxmlformats.org/officeDocument/2006/relationships" xmlns:p="http://schemas.openxmlformats.org/presentationml/2006/main">
   <p:cSld>
@@ -3063,8 +3852,8 @@
           <a:lstStyle/>
           <a:p>
             <a:r>
-              <a:rPr lang="zh-CN" altLang="en-US" dirty="0" smtClean="0"/>
-              <a:t>工作分工</a:t>
+              <a:rPr lang="en-US" altLang="zh-CN" dirty="0" smtClean="0"/>
+              <a:t>Requirements</a:t>
             </a:r>
             <a:endParaRPr lang="zh-CN" altLang="en-US" dirty="0"/>
           </a:p>
@@ -3085,14 +3874,167 @@
           <a:bodyPr/>
           <a:lstStyle/>
           <a:p>
-            <a:endParaRPr lang="zh-CN" altLang="en-US"/>
+            <a:pPr marL="0" indent="0">
+              <a:buNone/>
+            </a:pPr>
+            <a:endParaRPr lang="zh-CN" altLang="en-US" dirty="0"/>
           </a:p>
         </p:txBody>
       </p:sp>
     </p:spTree>
     <p:extLst>
       <p:ext uri="{BB962C8B-B14F-4D97-AF65-F5344CB8AC3E}">
-        <p14:creationId xmlns:p14="http://schemas.microsoft.com/office/powerpoint/2010/main" val="384563103"/>
+        <p14:creationId xmlns:p14="http://schemas.microsoft.com/office/powerpoint/2010/main" val="3453244879"/>
+      </p:ext>
+    </p:extLst>
+  </p:cSld>
+  <p:clrMapOvr>
+    <a:masterClrMapping/>
+  </p:clrMapOvr>
+</p:sld>
+</file>
+
+<file path=ppt/slides/slide20.xml><?xml version="1.0" encoding="utf-8"?>
+<p:sld xmlns:a="http://schemas.openxmlformats.org/drawingml/2006/main" xmlns:r="http://schemas.openxmlformats.org/officeDocument/2006/relationships" xmlns:p="http://schemas.openxmlformats.org/presentationml/2006/main">
+  <p:cSld>
+    <p:spTree>
+      <p:nvGrpSpPr>
+        <p:cNvPr id="1" name=""/>
+        <p:cNvGrpSpPr/>
+        <p:nvPr/>
+      </p:nvGrpSpPr>
+      <p:grpSpPr>
+        <a:xfrm>
+          <a:off x="0" y="0"/>
+          <a:ext cx="0" cy="0"/>
+          <a:chOff x="0" y="0"/>
+          <a:chExt cx="0" cy="0"/>
+        </a:xfrm>
+      </p:grpSpPr>
+      <p:sp>
+        <p:nvSpPr>
+          <p:cNvPr id="2" name="标题 1"/>
+          <p:cNvSpPr>
+            <a:spLocks noGrp="1"/>
+          </p:cNvSpPr>
+          <p:nvPr>
+            <p:ph type="title"/>
+          </p:nvPr>
+        </p:nvSpPr>
+        <p:spPr/>
+        <p:txBody>
+          <a:bodyPr>
+            <a:normAutofit/>
+          </a:bodyPr>
+          <a:lstStyle/>
+          <a:p>
+            <a:r>
+              <a:rPr lang="en-US" altLang="zh-CN" dirty="0" smtClean="0"/>
+              <a:t>Current Progress</a:t>
+            </a:r>
+            <a:endParaRPr lang="zh-CN" altLang="en-US" dirty="0"/>
+          </a:p>
+        </p:txBody>
+      </p:sp>
+      <p:sp>
+        <p:nvSpPr>
+          <p:cNvPr id="3" name="内容占位符 2"/>
+          <p:cNvSpPr>
+            <a:spLocks noGrp="1"/>
+          </p:cNvSpPr>
+          <p:nvPr>
+            <p:ph idx="1"/>
+          </p:nvPr>
+        </p:nvSpPr>
+        <p:spPr/>
+        <p:txBody>
+          <a:bodyPr/>
+          <a:lstStyle/>
+          <a:p>
+            <a:endParaRPr lang="zh-CN" altLang="en-US" dirty="0"/>
+          </a:p>
+        </p:txBody>
+      </p:sp>
+    </p:spTree>
+    <p:extLst>
+      <p:ext uri="{BB962C8B-B14F-4D97-AF65-F5344CB8AC3E}">
+        <p14:creationId xmlns:p14="http://schemas.microsoft.com/office/powerpoint/2010/main" val="2945202610"/>
+      </p:ext>
+    </p:extLst>
+  </p:cSld>
+  <p:clrMapOvr>
+    <a:masterClrMapping/>
+  </p:clrMapOvr>
+</p:sld>
+</file>
+
+<file path=ppt/slides/slide21.xml><?xml version="1.0" encoding="utf-8"?>
+<p:sld xmlns:a="http://schemas.openxmlformats.org/drawingml/2006/main" xmlns:r="http://schemas.openxmlformats.org/officeDocument/2006/relationships" xmlns:p="http://schemas.openxmlformats.org/presentationml/2006/main">
+  <p:cSld>
+    <p:spTree>
+      <p:nvGrpSpPr>
+        <p:cNvPr id="1" name=""/>
+        <p:cNvGrpSpPr/>
+        <p:nvPr/>
+      </p:nvGrpSpPr>
+      <p:grpSpPr>
+        <a:xfrm>
+          <a:off x="0" y="0"/>
+          <a:ext cx="0" cy="0"/>
+          <a:chOff x="0" y="0"/>
+          <a:chExt cx="0" cy="0"/>
+        </a:xfrm>
+      </p:grpSpPr>
+      <p:sp>
+        <p:nvSpPr>
+          <p:cNvPr id="2" name="标题 1"/>
+          <p:cNvSpPr>
+            <a:spLocks noGrp="1"/>
+          </p:cNvSpPr>
+          <p:nvPr>
+            <p:ph type="title"/>
+          </p:nvPr>
+        </p:nvSpPr>
+        <p:spPr/>
+        <p:txBody>
+          <a:bodyPr/>
+          <a:lstStyle/>
+          <a:p>
+            <a:r>
+              <a:rPr lang="en-US" altLang="zh-CN" dirty="0" smtClean="0"/>
+              <a:t>To be </a:t>
+            </a:r>
+            <a:r>
+              <a:rPr lang="en-US" altLang="zh-CN" dirty="0" smtClean="0"/>
+              <a:t>improved</a:t>
+            </a:r>
+            <a:endParaRPr lang="zh-CN" altLang="en-US" dirty="0"/>
+          </a:p>
+        </p:txBody>
+      </p:sp>
+      <p:sp>
+        <p:nvSpPr>
+          <p:cNvPr id="3" name="内容占位符 2"/>
+          <p:cNvSpPr>
+            <a:spLocks noGrp="1"/>
+          </p:cNvSpPr>
+          <p:nvPr>
+            <p:ph idx="1"/>
+          </p:nvPr>
+        </p:nvSpPr>
+        <p:spPr/>
+        <p:txBody>
+          <a:bodyPr/>
+          <a:lstStyle/>
+          <a:p>
+            <a:endParaRPr lang="zh-CN" altLang="en-US" dirty="0"/>
+          </a:p>
+        </p:txBody>
+      </p:sp>
+    </p:spTree>
+    <p:extLst>
+      <p:ext uri="{BB962C8B-B14F-4D97-AF65-F5344CB8AC3E}">
+        <p14:creationId xmlns:p14="http://schemas.microsoft.com/office/powerpoint/2010/main" val="4215372827"/>
       </p:ext>
     </p:extLst>
   </p:cSld>
@@ -3135,8 +4077,8 @@
           <a:lstStyle/>
           <a:p>
             <a:r>
-              <a:rPr lang="zh-CN" altLang="en-US" dirty="0" smtClean="0"/>
-              <a:t>采用技术分析</a:t>
+              <a:rPr lang="en-US" altLang="zh-CN" dirty="0" smtClean="0"/>
+              <a:t>Function List</a:t>
             </a:r>
             <a:endParaRPr lang="zh-CN" altLang="en-US" dirty="0"/>
           </a:p>
@@ -3157,14 +4099,17 @@
           <a:bodyPr/>
           <a:lstStyle/>
           <a:p>
-            <a:endParaRPr lang="zh-CN" altLang="en-US"/>
+            <a:pPr marL="0" indent="0">
+              <a:buNone/>
+            </a:pPr>
+            <a:endParaRPr lang="zh-CN" altLang="en-US" dirty="0"/>
           </a:p>
         </p:txBody>
       </p:sp>
     </p:spTree>
     <p:extLst>
       <p:ext uri="{BB962C8B-B14F-4D97-AF65-F5344CB8AC3E}">
-        <p14:creationId xmlns:p14="http://schemas.microsoft.com/office/powerpoint/2010/main" val="215661021"/>
+        <p14:creationId xmlns:p14="http://schemas.microsoft.com/office/powerpoint/2010/main" val="3255526592"/>
       </p:ext>
     </p:extLst>
   </p:cSld>
@@ -3208,7 +4153,7 @@
           <a:p>
             <a:r>
               <a:rPr lang="en-US" altLang="zh-CN" dirty="0" smtClean="0"/>
-              <a:t>Demo</a:t>
+              <a:t>Demonstration</a:t>
             </a:r>
             <a:endParaRPr lang="zh-CN" altLang="en-US" dirty="0"/>
           </a:p>
@@ -3229,7 +4174,17 @@
           <a:bodyPr/>
           <a:lstStyle/>
           <a:p>
-            <a:endParaRPr lang="zh-CN" altLang="en-US"/>
+            <a:r>
+              <a:rPr lang="en-US" altLang="zh-CN" dirty="0" smtClean="0"/>
+              <a:t>GUI PIC</a:t>
+            </a:r>
+          </a:p>
+          <a:p>
+            <a:r>
+              <a:rPr lang="en-US" altLang="zh-CN" dirty="0" smtClean="0"/>
+              <a:t>May be 2-3 Pages or show our demo directly.</a:t>
+            </a:r>
+            <a:endParaRPr lang="zh-CN" altLang="en-US" dirty="0"/>
           </a:p>
         </p:txBody>
       </p:sp>
@@ -3279,8 +4234,8 @@
           <a:lstStyle/>
           <a:p>
             <a:r>
-              <a:rPr lang="zh-CN" altLang="en-US" dirty="0" smtClean="0"/>
-              <a:t>需求</a:t>
+              <a:rPr lang="en-US" altLang="zh-CN" dirty="0" smtClean="0"/>
+              <a:t>Demonstration</a:t>
             </a:r>
             <a:endParaRPr lang="zh-CN" altLang="en-US" dirty="0"/>
           </a:p>
@@ -3301,14 +4256,24 @@
           <a:bodyPr/>
           <a:lstStyle/>
           <a:p>
-            <a:endParaRPr lang="zh-CN" altLang="en-US"/>
+            <a:r>
+              <a:rPr lang="en-US" altLang="zh-CN" dirty="0" smtClean="0"/>
+              <a:t>GUI PIC</a:t>
+            </a:r>
+          </a:p>
+          <a:p>
+            <a:r>
+              <a:rPr lang="en-US" altLang="zh-CN" dirty="0" smtClean="0"/>
+              <a:t>May be 2-3 Pages or show our demo directly.</a:t>
+            </a:r>
+            <a:endParaRPr lang="zh-CN" altLang="en-US" dirty="0"/>
           </a:p>
         </p:txBody>
       </p:sp>
     </p:spTree>
     <p:extLst>
       <p:ext uri="{BB962C8B-B14F-4D97-AF65-F5344CB8AC3E}">
-        <p14:creationId xmlns:p14="http://schemas.microsoft.com/office/powerpoint/2010/main" val="3453244879"/>
+        <p14:creationId xmlns:p14="http://schemas.microsoft.com/office/powerpoint/2010/main" val="4083825079"/>
       </p:ext>
     </p:extLst>
   </p:cSld>
@@ -3352,11 +4317,7 @@
           <a:p>
             <a:r>
               <a:rPr lang="en-US" altLang="zh-CN" dirty="0" smtClean="0"/>
-              <a:t>SSL</a:t>
-            </a:r>
-            <a:r>
-              <a:rPr lang="zh-CN" altLang="en-US" dirty="0" smtClean="0"/>
-              <a:t>技术详解</a:t>
+              <a:t>Software Architecture</a:t>
             </a:r>
             <a:endParaRPr lang="zh-CN" altLang="en-US" dirty="0"/>
           </a:p>
@@ -3377,14 +4338,23 @@
           <a:bodyPr/>
           <a:lstStyle/>
           <a:p>
-            <a:endParaRPr lang="zh-CN" altLang="en-US"/>
+            <a:r>
+              <a:rPr lang="en-US" altLang="zh-CN" dirty="0" smtClean="0"/>
+              <a:t>Architecture diagram</a:t>
+            </a:r>
+          </a:p>
+          <a:p>
+            <a:pPr marL="0" indent="0">
+              <a:buNone/>
+            </a:pPr>
+            <a:endParaRPr lang="zh-CN" altLang="en-US" dirty="0"/>
           </a:p>
         </p:txBody>
       </p:sp>
     </p:spTree>
     <p:extLst>
       <p:ext uri="{BB962C8B-B14F-4D97-AF65-F5344CB8AC3E}">
-        <p14:creationId xmlns:p14="http://schemas.microsoft.com/office/powerpoint/2010/main" val="175027226"/>
+        <p14:creationId xmlns:p14="http://schemas.microsoft.com/office/powerpoint/2010/main" val="4019276053"/>
       </p:ext>
     </p:extLst>
   </p:cSld>
@@ -3427,8 +4397,8 @@
           <a:lstStyle/>
           <a:p>
             <a:r>
-              <a:rPr lang="zh-CN" altLang="en-US" dirty="0" smtClean="0"/>
-              <a:t>项目管理（思维导图）</a:t>
+              <a:rPr lang="en-US" altLang="zh-CN" dirty="0" smtClean="0"/>
+              <a:t>Demonstration </a:t>
             </a:r>
             <a:endParaRPr lang="zh-CN" altLang="en-US" dirty="0"/>
           </a:p>
@@ -3449,14 +4419,24 @@
           <a:bodyPr/>
           <a:lstStyle/>
           <a:p>
-            <a:endParaRPr lang="zh-CN" altLang="en-US"/>
+            <a:r>
+              <a:rPr lang="en-US" altLang="zh-CN" dirty="0" smtClean="0"/>
+              <a:t>GUI PIC</a:t>
+            </a:r>
+          </a:p>
+          <a:p>
+            <a:r>
+              <a:rPr lang="en-US" altLang="zh-CN" dirty="0" smtClean="0"/>
+              <a:t>May be 2-3 Pages or show our demo directly.</a:t>
+            </a:r>
+            <a:endParaRPr lang="zh-CN" altLang="en-US" dirty="0"/>
           </a:p>
         </p:txBody>
       </p:sp>
     </p:spTree>
     <p:extLst>
       <p:ext uri="{BB962C8B-B14F-4D97-AF65-F5344CB8AC3E}">
-        <p14:creationId xmlns:p14="http://schemas.microsoft.com/office/powerpoint/2010/main" val="1191718613"/>
+        <p14:creationId xmlns:p14="http://schemas.microsoft.com/office/powerpoint/2010/main" val="4131575587"/>
       </p:ext>
     </p:extLst>
   </p:cSld>
@@ -3499,8 +4479,8 @@
           <a:lstStyle/>
           <a:p>
             <a:r>
-              <a:rPr lang="zh-CN" altLang="en-US" dirty="0" smtClean="0"/>
-              <a:t>后续改进</a:t>
+              <a:rPr lang="en-US" altLang="zh-CN" dirty="0" smtClean="0"/>
+              <a:t>Used Technology List</a:t>
             </a:r>
             <a:endParaRPr lang="zh-CN" altLang="en-US" dirty="0"/>
           </a:p>
@@ -3521,14 +4501,126 @@
           <a:bodyPr/>
           <a:lstStyle/>
           <a:p>
-            <a:endParaRPr lang="zh-CN" altLang="en-US"/>
+            <a:r>
+              <a:rPr lang="en-US" altLang="zh-CN" dirty="0" smtClean="0"/>
+              <a:t>SSL Communication</a:t>
+            </a:r>
+          </a:p>
+          <a:p>
+            <a:r>
+              <a:rPr lang="en-US" altLang="zh-CN" dirty="0" err="1" smtClean="0"/>
+              <a:t>Inotify</a:t>
+            </a:r>
+            <a:endParaRPr lang="en-US" altLang="zh-CN" dirty="0"/>
+          </a:p>
+          <a:p>
+            <a:r>
+              <a:rPr lang="en-US" altLang="zh-CN" dirty="0" smtClean="0"/>
+              <a:t>GIT API</a:t>
+            </a:r>
+          </a:p>
+          <a:p>
+            <a:r>
+              <a:rPr lang="en-US" altLang="zh-CN" dirty="0" smtClean="0"/>
+              <a:t>System Pipe</a:t>
+            </a:r>
+          </a:p>
+          <a:p>
+            <a:endParaRPr lang="en-US" altLang="zh-CN" dirty="0" smtClean="0"/>
+          </a:p>
+          <a:p>
+            <a:endParaRPr lang="zh-CN" altLang="en-US" dirty="0"/>
           </a:p>
         </p:txBody>
       </p:sp>
     </p:spTree>
     <p:extLst>
       <p:ext uri="{BB962C8B-B14F-4D97-AF65-F5344CB8AC3E}">
-        <p14:creationId xmlns:p14="http://schemas.microsoft.com/office/powerpoint/2010/main" val="2945202610"/>
+        <p14:creationId xmlns:p14="http://schemas.microsoft.com/office/powerpoint/2010/main" val="215661021"/>
+      </p:ext>
+    </p:extLst>
+  </p:cSld>
+  <p:clrMapOvr>
+    <a:masterClrMapping/>
+  </p:clrMapOvr>
+</p:sld>
+</file>
+
+<file path=ppt/slides/slide9.xml><?xml version="1.0" encoding="utf-8"?>
+<p:sld xmlns:a="http://schemas.openxmlformats.org/drawingml/2006/main" xmlns:r="http://schemas.openxmlformats.org/officeDocument/2006/relationships" xmlns:p="http://schemas.openxmlformats.org/presentationml/2006/main">
+  <p:cSld>
+    <p:spTree>
+      <p:nvGrpSpPr>
+        <p:cNvPr id="1" name=""/>
+        <p:cNvGrpSpPr/>
+        <p:nvPr/>
+      </p:nvGrpSpPr>
+      <p:grpSpPr>
+        <a:xfrm>
+          <a:off x="0" y="0"/>
+          <a:ext cx="0" cy="0"/>
+          <a:chOff x="0" y="0"/>
+          <a:chExt cx="0" cy="0"/>
+        </a:xfrm>
+      </p:grpSpPr>
+      <p:sp>
+        <p:nvSpPr>
+          <p:cNvPr id="2" name="标题 1"/>
+          <p:cNvSpPr>
+            <a:spLocks noGrp="1"/>
+          </p:cNvSpPr>
+          <p:nvPr>
+            <p:ph type="title"/>
+          </p:nvPr>
+        </p:nvSpPr>
+        <p:spPr/>
+        <p:txBody>
+          <a:bodyPr/>
+          <a:lstStyle/>
+          <a:p>
+            <a:r>
+              <a:rPr lang="en-US" altLang="zh-CN" dirty="0" smtClean="0"/>
+              <a:t>SSL</a:t>
+            </a:r>
+            <a:r>
+              <a:rPr lang="zh-CN" altLang="en-US" dirty="0" smtClean="0"/>
+              <a:t> </a:t>
+            </a:r>
+            <a:r>
+              <a:rPr lang="en-US" altLang="zh-CN" dirty="0" smtClean="0"/>
+              <a:t>Communication</a:t>
+            </a:r>
+            <a:endParaRPr lang="zh-CN" altLang="en-US" dirty="0"/>
+          </a:p>
+        </p:txBody>
+      </p:sp>
+      <p:sp>
+        <p:nvSpPr>
+          <p:cNvPr id="3" name="内容占位符 2"/>
+          <p:cNvSpPr>
+            <a:spLocks noGrp="1"/>
+          </p:cNvSpPr>
+          <p:nvPr>
+            <p:ph idx="1"/>
+          </p:nvPr>
+        </p:nvSpPr>
+        <p:spPr/>
+        <p:txBody>
+          <a:bodyPr/>
+          <a:lstStyle/>
+          <a:p>
+            <a:r>
+              <a:rPr lang="en-US" altLang="zh-CN" dirty="0" smtClean="0"/>
+              <a:t>Maybe 2-3 Pages</a:t>
+            </a:r>
+            <a:endParaRPr lang="zh-CN" altLang="en-US" dirty="0"/>
+          </a:p>
+        </p:txBody>
+      </p:sp>
+    </p:spTree>
+    <p:extLst>
+      <p:ext uri="{BB962C8B-B14F-4D97-AF65-F5344CB8AC3E}">
+        <p14:creationId xmlns:p14="http://schemas.microsoft.com/office/powerpoint/2010/main" val="175027226"/>
       </p:ext>
     </p:extLst>
   </p:cSld>

</xml_diff>